<commit_message>
Adding GUI application for flood prediction and various documentation and model files. Final commit for project submission. Final Report and related documents added.
</commit_message>
<xml_diff>
--- a/presentation_projet final.pptx
+++ b/presentation_projet final.pptx
@@ -2,7 +2,7 @@
 <file path=ppt/presentation.xml><?xml version="1.0" encoding="utf-8"?>
 <p:presentation xmlns:a="http://schemas.openxmlformats.org/drawingml/2006/main" xmlns:r="http://schemas.openxmlformats.org/officeDocument/2006/relationships" xmlns:p="http://schemas.openxmlformats.org/presentationml/2006/main" saveSubsetFonts="1" autoCompressPictures="0">
   <p:sldMasterIdLst>
-    <p:sldMasterId id="2147483778" r:id="rId1"/>
+    <p:sldMasterId id="2147483873" r:id="rId1"/>
   </p:sldMasterIdLst>
   <p:notesMasterIdLst>
     <p:notesMasterId r:id="rId10"/>
@@ -215,7 +215,7 @@
           <a:p>
             <a:fld id="{69E6E1B4-BDB5-4CA1-8421-DFD79820A177}" type="datetimeFigureOut">
               <a:rPr lang="fr-FR" smtClean="0"/>
-              <a:t>17/12/2025</a:t>
+              <a:t>06/01/2026</a:t>
             </a:fld>
             <a:endParaRPr lang="fr-FR"/>
           </a:p>
@@ -639,7 +639,7 @@
           <a:p>
             <a:fld id="{17EC18B4-2C05-4519-BB11-FC80A41B7872}" type="datetime1">
               <a:rPr lang="en-US" smtClean="0"/>
-              <a:t>12/17/2025</a:t>
+              <a:t>1/6/2026</a:t>
             </a:fld>
             <a:endParaRPr lang="en-US"/>
           </a:p>
@@ -890,7 +890,7 @@
     </p:spTree>
     <p:extLst>
       <p:ext uri="{BB962C8B-B14F-4D97-AF65-F5344CB8AC3E}">
-        <p14:creationId xmlns:p14="http://schemas.microsoft.com/office/powerpoint/2010/main" val="1088979064"/>
+        <p14:creationId xmlns:p14="http://schemas.microsoft.com/office/powerpoint/2010/main" val="1837579943"/>
       </p:ext>
     </p:extLst>
   </p:cSld>
@@ -1030,7 +1030,7 @@
           <a:p>
             <a:fld id="{D1916CBE-6141-4D1F-A2AD-6C91106889A1}" type="datetime1">
               <a:rPr lang="en-US" smtClean="0"/>
-              <a:t>12/17/2025</a:t>
+              <a:t>1/6/2026</a:t>
             </a:fld>
             <a:endParaRPr lang="en-US"/>
           </a:p>
@@ -1097,7 +1097,7 @@
     </p:spTree>
     <p:extLst>
       <p:ext uri="{BB962C8B-B14F-4D97-AF65-F5344CB8AC3E}">
-        <p14:creationId xmlns:p14="http://schemas.microsoft.com/office/powerpoint/2010/main" val="3766216726"/>
+        <p14:creationId xmlns:p14="http://schemas.microsoft.com/office/powerpoint/2010/main" val="267903194"/>
       </p:ext>
     </p:extLst>
   </p:cSld>
@@ -1244,7 +1244,7 @@
           <a:p>
             <a:fld id="{58E6F12D-A246-4F40-8244-53DE16598144}" type="datetime1">
               <a:rPr lang="en-US" smtClean="0"/>
-              <a:t>12/17/2025</a:t>
+              <a:t>1/6/2026</a:t>
             </a:fld>
             <a:endParaRPr lang="en-US"/>
           </a:p>
@@ -1311,7 +1311,7 @@
     </p:spTree>
     <p:extLst>
       <p:ext uri="{BB962C8B-B14F-4D97-AF65-F5344CB8AC3E}">
-        <p14:creationId xmlns:p14="http://schemas.microsoft.com/office/powerpoint/2010/main" val="1065886541"/>
+        <p14:creationId xmlns:p14="http://schemas.microsoft.com/office/powerpoint/2010/main" val="1003850274"/>
       </p:ext>
     </p:extLst>
   </p:cSld>
@@ -1507,7 +1507,7 @@
           <a:p>
             <a:fld id="{6C15CCBA-DA9E-4CCF-9558-E80C0C0E5B35}" type="datetime1">
               <a:rPr lang="en-US" smtClean="0"/>
-              <a:t>12/17/2025</a:t>
+              <a:t>1/6/2026</a:t>
             </a:fld>
             <a:endParaRPr lang="en-US"/>
           </a:p>
@@ -1714,7 +1714,7 @@
     </p:spTree>
     <p:extLst>
       <p:ext uri="{BB962C8B-B14F-4D97-AF65-F5344CB8AC3E}">
-        <p14:creationId xmlns:p14="http://schemas.microsoft.com/office/powerpoint/2010/main" val="3760052384"/>
+        <p14:creationId xmlns:p14="http://schemas.microsoft.com/office/powerpoint/2010/main" val="1491956628"/>
       </p:ext>
     </p:extLst>
   </p:cSld>
@@ -1930,7 +1930,7 @@
           <a:p>
             <a:fld id="{2E839452-0BB3-4187-B5AD-B5FA37699F6E}" type="datetime1">
               <a:rPr lang="en-US" smtClean="0"/>
-              <a:t>12/17/2025</a:t>
+              <a:t>1/6/2026</a:t>
             </a:fld>
             <a:endParaRPr lang="en-US"/>
           </a:p>
@@ -1997,7 +1997,7 @@
     </p:spTree>
     <p:extLst>
       <p:ext uri="{BB962C8B-B14F-4D97-AF65-F5344CB8AC3E}">
-        <p14:creationId xmlns:p14="http://schemas.microsoft.com/office/powerpoint/2010/main" val="1687653801"/>
+        <p14:creationId xmlns:p14="http://schemas.microsoft.com/office/powerpoint/2010/main" val="3952984688"/>
       </p:ext>
     </p:extLst>
   </p:cSld>
@@ -2202,7 +2202,7 @@
           <a:p>
             <a:fld id="{43F09926-9DFC-44E9-9EF0-F80A475E56C5}" type="datetime1">
               <a:rPr lang="en-US" smtClean="0"/>
-              <a:t>12/17/2025</a:t>
+              <a:t>1/6/2026</a:t>
             </a:fld>
             <a:endParaRPr lang="en-US"/>
           </a:p>
@@ -2269,7 +2269,7 @@
     </p:spTree>
     <p:extLst>
       <p:ext uri="{BB962C8B-B14F-4D97-AF65-F5344CB8AC3E}">
-        <p14:creationId xmlns:p14="http://schemas.microsoft.com/office/powerpoint/2010/main" val="676884569"/>
+        <p14:creationId xmlns:p14="http://schemas.microsoft.com/office/powerpoint/2010/main" val="4073140677"/>
       </p:ext>
     </p:extLst>
   </p:cSld>
@@ -2621,7 +2621,7 @@
           <a:p>
             <a:fld id="{1E3643C1-2D1A-477E-9DED-91DD0584A91B}" type="datetime1">
               <a:rPr lang="en-US" smtClean="0"/>
-              <a:t>12/17/2025</a:t>
+              <a:t>1/6/2026</a:t>
             </a:fld>
             <a:endParaRPr lang="en-US"/>
           </a:p>
@@ -2688,7 +2688,7 @@
     </p:spTree>
     <p:extLst>
       <p:ext uri="{BB962C8B-B14F-4D97-AF65-F5344CB8AC3E}">
-        <p14:creationId xmlns:p14="http://schemas.microsoft.com/office/powerpoint/2010/main" val="725233039"/>
+        <p14:creationId xmlns:p14="http://schemas.microsoft.com/office/powerpoint/2010/main" val="88229971"/>
       </p:ext>
     </p:extLst>
   </p:cSld>
@@ -2767,7 +2767,7 @@
           <a:p>
             <a:fld id="{691BFC44-5EF0-4720-9F10-E80F6B8E4AFE}" type="datetime1">
               <a:rPr lang="en-US" smtClean="0"/>
-              <a:t>12/17/2025</a:t>
+              <a:t>1/6/2026</a:t>
             </a:fld>
             <a:endParaRPr lang="en-US"/>
           </a:p>
@@ -2834,7 +2834,7 @@
     </p:spTree>
     <p:extLst>
       <p:ext uri="{BB962C8B-B14F-4D97-AF65-F5344CB8AC3E}">
-        <p14:creationId xmlns:p14="http://schemas.microsoft.com/office/powerpoint/2010/main" val="2392115348"/>
+        <p14:creationId xmlns:p14="http://schemas.microsoft.com/office/powerpoint/2010/main" val="2055397794"/>
       </p:ext>
     </p:extLst>
   </p:cSld>
@@ -2884,7 +2884,7 @@
           <a:p>
             <a:fld id="{9BD7A66F-BBDC-434C-B532-9CA2FA20D0AC}" type="datetime1">
               <a:rPr lang="en-US" smtClean="0"/>
-              <a:t>12/17/2025</a:t>
+              <a:t>1/6/2026</a:t>
             </a:fld>
             <a:endParaRPr lang="en-US"/>
           </a:p>
@@ -2951,7 +2951,7 @@
     </p:spTree>
     <p:extLst>
       <p:ext uri="{BB962C8B-B14F-4D97-AF65-F5344CB8AC3E}">
-        <p14:creationId xmlns:p14="http://schemas.microsoft.com/office/powerpoint/2010/main" val="1887330351"/>
+        <p14:creationId xmlns:p14="http://schemas.microsoft.com/office/powerpoint/2010/main" val="2604813644"/>
       </p:ext>
     </p:extLst>
   </p:cSld>
@@ -3201,7 +3201,7 @@
           <a:p>
             <a:fld id="{42F5FC6A-84AE-4C9E-AD6F-B03A686D2F4E}" type="datetime1">
               <a:rPr lang="en-US" smtClean="0"/>
-              <a:t>12/17/2025</a:t>
+              <a:t>1/6/2026</a:t>
             </a:fld>
             <a:endParaRPr lang="en-US"/>
           </a:p>
@@ -3268,7 +3268,7 @@
     </p:spTree>
     <p:extLst>
       <p:ext uri="{BB962C8B-B14F-4D97-AF65-F5344CB8AC3E}">
-        <p14:creationId xmlns:p14="http://schemas.microsoft.com/office/powerpoint/2010/main" val="1930824629"/>
+        <p14:creationId xmlns:p14="http://schemas.microsoft.com/office/powerpoint/2010/main" val="3977034198"/>
       </p:ext>
     </p:extLst>
   </p:cSld>
@@ -3498,7 +3498,7 @@
           <a:p>
             <a:fld id="{F279F8A9-1151-4BB8-BE41-2720695FBD9B}" type="datetime1">
               <a:rPr lang="en-US" smtClean="0"/>
-              <a:t>12/17/2025</a:t>
+              <a:t>1/6/2026</a:t>
             </a:fld>
             <a:endParaRPr lang="en-US"/>
           </a:p>
@@ -3565,7 +3565,7 @@
     </p:spTree>
     <p:extLst>
       <p:ext uri="{BB962C8B-B14F-4D97-AF65-F5344CB8AC3E}">
-        <p14:creationId xmlns:p14="http://schemas.microsoft.com/office/powerpoint/2010/main" val="2073302098"/>
+        <p14:creationId xmlns:p14="http://schemas.microsoft.com/office/powerpoint/2010/main" val="398908835"/>
       </p:ext>
     </p:extLst>
   </p:cSld>
@@ -3745,7 +3745,7 @@
           <a:p>
             <a:fld id="{94BE5C33-D3D8-4D57-874E-6570C7BCE481}" type="datetime1">
               <a:rPr lang="en-US" smtClean="0"/>
-              <a:t>12/17/2025</a:t>
+              <a:t>1/6/2026</a:t>
             </a:fld>
             <a:endParaRPr lang="en-US"/>
           </a:p>
@@ -3848,23 +3848,23 @@
     </p:spTree>
     <p:extLst>
       <p:ext uri="{BB962C8B-B14F-4D97-AF65-F5344CB8AC3E}">
-        <p14:creationId xmlns:p14="http://schemas.microsoft.com/office/powerpoint/2010/main" val="1672153301"/>
+        <p14:creationId xmlns:p14="http://schemas.microsoft.com/office/powerpoint/2010/main" val="2128454222"/>
       </p:ext>
     </p:extLst>
   </p:cSld>
   <p:clrMap bg1="lt1" tx1="dk1" bg2="lt2" tx2="dk2" accent1="accent1" accent2="accent2" accent3="accent3" accent4="accent4" accent5="accent5" accent6="accent6" hlink="hlink" folHlink="folHlink"/>
   <p:sldLayoutIdLst>
-    <p:sldLayoutId id="2147483779" r:id="rId1"/>
-    <p:sldLayoutId id="2147483780" r:id="rId2"/>
-    <p:sldLayoutId id="2147483781" r:id="rId3"/>
-    <p:sldLayoutId id="2147483782" r:id="rId4"/>
-    <p:sldLayoutId id="2147483783" r:id="rId5"/>
-    <p:sldLayoutId id="2147483784" r:id="rId6"/>
-    <p:sldLayoutId id="2147483785" r:id="rId7"/>
-    <p:sldLayoutId id="2147483786" r:id="rId8"/>
-    <p:sldLayoutId id="2147483787" r:id="rId9"/>
-    <p:sldLayoutId id="2147483788" r:id="rId10"/>
-    <p:sldLayoutId id="2147483789" r:id="rId11"/>
+    <p:sldLayoutId id="2147483874" r:id="rId1"/>
+    <p:sldLayoutId id="2147483875" r:id="rId2"/>
+    <p:sldLayoutId id="2147483876" r:id="rId3"/>
+    <p:sldLayoutId id="2147483877" r:id="rId4"/>
+    <p:sldLayoutId id="2147483878" r:id="rId5"/>
+    <p:sldLayoutId id="2147483879" r:id="rId6"/>
+    <p:sldLayoutId id="2147483880" r:id="rId7"/>
+    <p:sldLayoutId id="2147483881" r:id="rId8"/>
+    <p:sldLayoutId id="2147483882" r:id="rId9"/>
+    <p:sldLayoutId id="2147483883" r:id="rId10"/>
+    <p:sldLayoutId id="2147483884" r:id="rId11"/>
   </p:sldLayoutIdLst>
   <p:hf hdr="0"/>
   <p:txStyles>
@@ -4298,7 +4298,7 @@
           <a:p>
             <a:fld id="{CF13D734-D2F2-469B-A518-BC0C1682C8C5}" type="datetime1">
               <a:rPr lang="en-US" smtClean="0"/>
-              <a:t>12/17/2025</a:t>
+              <a:t>1/6/2026</a:t>
             </a:fld>
             <a:endParaRPr lang="en-US"/>
           </a:p>
@@ -4510,7 +4510,7 @@
           <a:p>
             <a:fld id="{B9660516-943A-4C0A-86C3-B3AE2AFB98D5}" type="datetime1">
               <a:rPr lang="en-US" smtClean="0"/>
-              <a:t>12/17/2025</a:t>
+              <a:t>1/6/2026</a:t>
             </a:fld>
             <a:endParaRPr lang="en-US"/>
           </a:p>
@@ -4872,7 +4872,7 @@
           <a:p>
             <a:fld id="{227BD420-D965-422B-A16A-8DC88896E5A0}" type="datetime1">
               <a:rPr lang="en-US" smtClean="0"/>
-              <a:t>12/17/2025</a:t>
+              <a:t>1/6/2026</a:t>
             </a:fld>
             <a:endParaRPr lang="en-US"/>
           </a:p>
@@ -5259,7 +5259,7 @@
           <a:p>
             <a:fld id="{23306D4A-00D9-48EC-940D-57AE54D4D04C}" type="datetime1">
               <a:rPr lang="en-US" smtClean="0"/>
-              <a:t>12/17/2025</a:t>
+              <a:t>1/6/2026</a:t>
             </a:fld>
             <a:endParaRPr lang="en-US"/>
           </a:p>
@@ -5630,7 +5630,7 @@
           <a:p>
             <a:fld id="{D3834C52-6166-42A3-B3F9-78796BD44414}" type="datetime1">
               <a:rPr lang="en-US" smtClean="0"/>
-              <a:t>12/17/2025</a:t>
+              <a:t>1/6/2026</a:t>
             </a:fld>
             <a:endParaRPr lang="en-US"/>
           </a:p>
@@ -5958,7 +5958,7 @@
           <a:p>
             <a:fld id="{B309BA56-AC26-4164-8F39-64CF2C10C7A9}" type="datetime1">
               <a:rPr lang="en-US" smtClean="0"/>
-              <a:t>12/17/2025</a:t>
+              <a:t>1/6/2026</a:t>
             </a:fld>
             <a:endParaRPr lang="en-US"/>
           </a:p>
@@ -6299,7 +6299,7 @@
           <a:p>
             <a:fld id="{DF6DE810-5DEB-4B8D-BFBA-DE0C1D92F583}" type="datetime1">
               <a:rPr lang="en-US" smtClean="0"/>
-              <a:t>12/17/2025</a:t>
+              <a:t>1/6/2026</a:t>
             </a:fld>
             <a:endParaRPr lang="en-US"/>
           </a:p>
@@ -6596,7 +6596,7 @@
           <a:p>
             <a:fld id="{B0EC4C7F-83DF-4A19-B3B2-6E5818D96673}" type="datetime1">
               <a:rPr lang="en-US" smtClean="0"/>
-              <a:t>12/17/2025</a:t>
+              <a:t>1/6/2026</a:t>
             </a:fld>
             <a:endParaRPr lang="en-US"/>
           </a:p>
@@ -6672,7 +6672,7 @@
 </file>
 
 <file path=ppt/theme/theme1.xml><?xml version="1.0" encoding="utf-8"?>
-<a:theme xmlns:a="http://schemas.openxmlformats.org/drawingml/2006/main" name="Office Theme">
+<a:theme xmlns:a="http://schemas.openxmlformats.org/drawingml/2006/main" name="Thème TPE INF 365">
   <a:themeElements>
     <a:clrScheme name="Office">
       <a:dk1>
@@ -6960,7 +6960,7 @@
   <a:extraClrSchemeLst/>
   <a:extLst>
     <a:ext uri="{05A4C25C-085E-4340-85A3-A5531E510DB2}">
-      <thm15:themeFamily xmlns:thm15="http://schemas.microsoft.com/office/thememl/2012/main" name="Office Theme" id="{62F939B6-93AF-4DB8-9C6B-D6C7DFDC589F}" vid="{4A3C46E8-61CC-4603-A589-7422A47A8E4A}"/>
+      <thm15:themeFamily xmlns:thm15="http://schemas.microsoft.com/office/thememl/2012/main" name="Thème TPE INF 365" id="{DED069CE-39B0-4EB4-9E7B-CFCBC45D31CA}" vid="{46C3A14A-6B38-495E-95EC-066CB5F7A611}"/>
     </a:ext>
   </a:extLst>
 </a:theme>

</xml_diff>